<commit_message>
Pushed moon and earth.
</commit_message>
<xml_diff>
--- a/poster.pptx
+++ b/poster.pptx
@@ -1900,7 +1900,7 @@
           </a:ln>
           <a:extLst>
             <a:ext uri="{C572A759-6A51-4108-AA02-DFA0A04FC94B}">
-              <ma14:wrappingTextBoxFlag xmlns:ma14="http://schemas.microsoft.com/office/mac/drawingml/2011/main" xmlns:a14="http://schemas.microsoft.com/office/drawing/2010/main" xmlns:m="http://schemas.openxmlformats.org/officeDocument/2006/math" xmlns="" val="1"/>
+              <ma14:wrappingTextBoxFlag xmlns="" xmlns:m="http://schemas.openxmlformats.org/officeDocument/2006/math" xmlns:a14="http://schemas.microsoft.com/office/drawing/2010/main" xmlns:ma14="http://schemas.microsoft.com/office/mac/drawingml/2011/main" val="1"/>
             </a:ext>
           </a:extLst>
         </p:spPr>
@@ -1939,7 +1939,7 @@
           </a:ln>
           <a:extLst>
             <a:ext uri="{C572A759-6A51-4108-AA02-DFA0A04FC94B}">
-              <ma14:wrappingTextBoxFlag xmlns:ma14="http://schemas.microsoft.com/office/mac/drawingml/2011/main" xmlns:a14="http://schemas.microsoft.com/office/drawing/2010/main" xmlns:m="http://schemas.openxmlformats.org/officeDocument/2006/math" xmlns="" val="1"/>
+              <ma14:wrappingTextBoxFlag xmlns="" xmlns:m="http://schemas.openxmlformats.org/officeDocument/2006/math" xmlns:a14="http://schemas.microsoft.com/office/drawing/2010/main" xmlns:ma14="http://schemas.microsoft.com/office/mac/drawingml/2011/main" val="1"/>
             </a:ext>
           </a:extLst>
         </p:spPr>
@@ -2814,7 +2814,7 @@
           </a:ln>
           <a:extLst>
             <a:ext uri="{C572A759-6A51-4108-AA02-DFA0A04FC94B}">
-              <ma14:wrappingTextBoxFlag xmlns:ma14="http://schemas.microsoft.com/office/mac/drawingml/2011/main" xmlns:a14="http://schemas.microsoft.com/office/drawing/2010/main" xmlns:m="http://schemas.openxmlformats.org/officeDocument/2006/math" xmlns="" val="1"/>
+              <ma14:wrappingTextBoxFlag xmlns="" xmlns:m="http://schemas.openxmlformats.org/officeDocument/2006/math" xmlns:a14="http://schemas.microsoft.com/office/drawing/2010/main" xmlns:ma14="http://schemas.microsoft.com/office/mac/drawingml/2011/main" val="1"/>
             </a:ext>
           </a:extLst>
         </p:spPr>
@@ -2986,7 +2986,7 @@
           </a:ln>
           <a:extLst>
             <a:ext uri="{C572A759-6A51-4108-AA02-DFA0A04FC94B}">
-              <ma14:wrappingTextBoxFlag xmlns:ma14="http://schemas.microsoft.com/office/mac/drawingml/2011/main" xmlns:a14="http://schemas.microsoft.com/office/drawing/2010/main" xmlns:m="http://schemas.openxmlformats.org/officeDocument/2006/math" xmlns="" val="1"/>
+              <ma14:wrappingTextBoxFlag xmlns="" xmlns:m="http://schemas.openxmlformats.org/officeDocument/2006/math" xmlns:a14="http://schemas.microsoft.com/office/drawing/2010/main" xmlns:ma14="http://schemas.microsoft.com/office/mac/drawingml/2011/main" val="1"/>
             </a:ext>
           </a:extLst>
         </p:spPr>
@@ -3040,7 +3040,7 @@
           </a:ln>
           <a:extLst>
             <a:ext uri="{C572A759-6A51-4108-AA02-DFA0A04FC94B}">
-              <ma14:wrappingTextBoxFlag xmlns:ma14="http://schemas.microsoft.com/office/mac/drawingml/2011/main" xmlns:a14="http://schemas.microsoft.com/office/drawing/2010/main" xmlns:m="http://schemas.openxmlformats.org/officeDocument/2006/math" xmlns="" val="1"/>
+              <ma14:wrappingTextBoxFlag xmlns="" xmlns:m="http://schemas.openxmlformats.org/officeDocument/2006/math" xmlns:a14="http://schemas.microsoft.com/office/drawing/2010/main" xmlns:ma14="http://schemas.microsoft.com/office/mac/drawingml/2011/main" val="1"/>
             </a:ext>
           </a:extLst>
         </p:spPr>
@@ -3081,7 +3081,7 @@
           </a:ln>
           <a:extLst>
             <a:ext uri="{C572A759-6A51-4108-AA02-DFA0A04FC94B}">
-              <ma14:wrappingTextBoxFlag xmlns:ma14="http://schemas.microsoft.com/office/mac/drawingml/2011/main" xmlns:a14="http://schemas.microsoft.com/office/drawing/2010/main" xmlns:m="http://schemas.openxmlformats.org/officeDocument/2006/math" xmlns="" val="1"/>
+              <ma14:wrappingTextBoxFlag xmlns="" xmlns:m="http://schemas.openxmlformats.org/officeDocument/2006/math" xmlns:a14="http://schemas.microsoft.com/office/drawing/2010/main" xmlns:ma14="http://schemas.microsoft.com/office/mac/drawingml/2011/main" val="1"/>
             </a:ext>
           </a:extLst>
         </p:spPr>
@@ -3249,7 +3249,7 @@
           </a:ln>
           <a:extLst>
             <a:ext uri="{C572A759-6A51-4108-AA02-DFA0A04FC94B}">
-              <ma14:wrappingTextBoxFlag xmlns:ma14="http://schemas.microsoft.com/office/mac/drawingml/2011/main" xmlns:a14="http://schemas.microsoft.com/office/drawing/2010/main" xmlns:m="http://schemas.openxmlformats.org/officeDocument/2006/math" xmlns="" val="1"/>
+              <ma14:wrappingTextBoxFlag xmlns="" xmlns:m="http://schemas.openxmlformats.org/officeDocument/2006/math" xmlns:a14="http://schemas.microsoft.com/office/drawing/2010/main" xmlns:ma14="http://schemas.microsoft.com/office/mac/drawingml/2011/main" val="1"/>
             </a:ext>
           </a:extLst>
         </p:spPr>
@@ -3293,7 +3293,7 @@
           </a:ln>
           <a:extLst>
             <a:ext uri="{C572A759-6A51-4108-AA02-DFA0A04FC94B}">
-              <ma14:wrappingTextBoxFlag xmlns:ma14="http://schemas.microsoft.com/office/mac/drawingml/2011/main" xmlns:a14="http://schemas.microsoft.com/office/drawing/2010/main" xmlns:m="http://schemas.openxmlformats.org/officeDocument/2006/math" xmlns="" val="1"/>
+              <ma14:wrappingTextBoxFlag xmlns="" xmlns:m="http://schemas.openxmlformats.org/officeDocument/2006/math" xmlns:a14="http://schemas.microsoft.com/office/drawing/2010/main" xmlns:ma14="http://schemas.microsoft.com/office/mac/drawingml/2011/main" val="1"/>
             </a:ext>
           </a:extLst>
         </p:spPr>
@@ -3776,7 +3776,7 @@
           </a:ln>
           <a:extLst>
             <a:ext uri="{C572A759-6A51-4108-AA02-DFA0A04FC94B}">
-              <ma14:wrappingTextBoxFlag xmlns:ma14="http://schemas.microsoft.com/office/mac/drawingml/2011/main" xmlns:a14="http://schemas.microsoft.com/office/drawing/2010/main" xmlns:m="http://schemas.openxmlformats.org/officeDocument/2006/math" xmlns="" val="1"/>
+              <ma14:wrappingTextBoxFlag xmlns="" xmlns:m="http://schemas.openxmlformats.org/officeDocument/2006/math" xmlns:a14="http://schemas.microsoft.com/office/drawing/2010/main" xmlns:ma14="http://schemas.microsoft.com/office/mac/drawingml/2011/main" val="1"/>
             </a:ext>
           </a:extLst>
         </p:spPr>
@@ -4013,7 +4013,7 @@
         </p:blipFill>
         <p:spPr>
           <a:xfrm>
-            <a:off x="18927304" y="24571130"/>
+            <a:off x="29259795" y="24497950"/>
             <a:ext cx="1854949" cy="1854949"/>
           </a:xfrm>
           <a:prstGeom prst="rect">
@@ -4049,7 +4049,7 @@
         </p:blipFill>
         <p:spPr>
           <a:xfrm>
-            <a:off x="48897331" y="24614677"/>
+            <a:off x="36906097" y="24705443"/>
             <a:ext cx="1508149" cy="1540466"/>
           </a:xfrm>
           <a:prstGeom prst="rect">
@@ -4082,7 +4082,7 @@
           </a:ln>
           <a:extLst>
             <a:ext uri="{C572A759-6A51-4108-AA02-DFA0A04FC94B}">
-              <ma14:wrappingTextBoxFlag xmlns:ma14="http://schemas.microsoft.com/office/mac/drawingml/2011/main" xmlns:a14="http://schemas.microsoft.com/office/drawing/2010/main" xmlns:m="http://schemas.openxmlformats.org/officeDocument/2006/math" xmlns="" val="1"/>
+              <ma14:wrappingTextBoxFlag xmlns="" xmlns:m="http://schemas.openxmlformats.org/officeDocument/2006/math" xmlns:a14="http://schemas.microsoft.com/office/drawing/2010/main" xmlns:ma14="http://schemas.microsoft.com/office/mac/drawingml/2011/main" val="1"/>
             </a:ext>
           </a:extLst>
         </p:spPr>
@@ -5361,7 +5361,7 @@
           </a:ln>
           <a:extLst>
             <a:ext uri="{C572A759-6A51-4108-AA02-DFA0A04FC94B}">
-              <ma14:wrappingTextBoxFlag xmlns:ma14="http://schemas.microsoft.com/office/mac/drawingml/2011/main" xmlns:a14="http://schemas.microsoft.com/office/drawing/2010/main" xmlns:m="http://schemas.openxmlformats.org/officeDocument/2006/math" xmlns="" val="1"/>
+              <ma14:wrappingTextBoxFlag xmlns="" xmlns:m="http://schemas.openxmlformats.org/officeDocument/2006/math" xmlns:a14="http://schemas.microsoft.com/office/drawing/2010/main" xmlns:ma14="http://schemas.microsoft.com/office/mac/drawingml/2011/main" val="1"/>
             </a:ext>
           </a:extLst>
         </p:spPr>
@@ -5576,7 +5576,7 @@
           </a:ln>
           <a:extLst>
             <a:ext uri="{C572A759-6A51-4108-AA02-DFA0A04FC94B}">
-              <ma14:wrappingTextBoxFlag xmlns:ma14="http://schemas.microsoft.com/office/mac/drawingml/2011/main" xmlns:a14="http://schemas.microsoft.com/office/drawing/2010/main" xmlns:m="http://schemas.openxmlformats.org/officeDocument/2006/math" xmlns="" val="1"/>
+              <ma14:wrappingTextBoxFlag xmlns="" xmlns:m="http://schemas.openxmlformats.org/officeDocument/2006/math" xmlns:a14="http://schemas.microsoft.com/office/drawing/2010/main" xmlns:ma14="http://schemas.microsoft.com/office/mac/drawingml/2011/main" val="1"/>
             </a:ext>
           </a:extLst>
         </p:spPr>

</xml_diff>